<commit_message>
added office hour locations, updated Sign-in.pptx
</commit_message>
<xml_diff>
--- a/Slides/Sign In Please.pptx
+++ b/Slides/Sign In Please.pptx
@@ -104,6 +104,11 @@
       </a:defRPr>
     </a:lvl9pPr>
   </p:defaultTextStyle>
+  <p:extLst>
+    <p:ext uri="{EFAFB233-063F-42B5-8137-9DF3F51BA10A}">
+      <p15:sldGuideLst xmlns:p15="http://schemas.microsoft.com/office/powerpoint/2012/main"/>
+    </p:ext>
+  </p:extLst>
 </p:presentation>
 </file>
 
@@ -149,7 +154,7 @@
           </a:lstStyle>
           <a:p>
             <a:r>
-              <a:rPr lang="en-US" smtClean="0"/>
+              <a:rPr lang="en-US"/>
               <a:t>Click to edit Master title style</a:t>
             </a:r>
             <a:endParaRPr lang="en-US" dirty="0"/>
@@ -214,7 +219,7 @@
           </a:lstStyle>
           <a:p>
             <a:r>
-              <a:rPr lang="en-US" smtClean="0"/>
+              <a:rPr lang="en-US"/>
               <a:t>Click to edit Master subtitle style</a:t>
             </a:r>
             <a:endParaRPr lang="en-US" dirty="0"/>
@@ -238,7 +243,7 @@
           <a:p>
             <a:fld id="{87D48944-457E-4F70-A2DD-5C8A7CFEF89A}" type="datetimeFigureOut">
               <a:rPr lang="en-US" smtClean="0"/>
-              <a:t>9/30/2015</a:t>
+              <a:t>9/12/2017</a:t>
             </a:fld>
             <a:endParaRPr lang="en-US"/>
           </a:p>
@@ -332,7 +337,7 @@
           <a:lstStyle/>
           <a:p>
             <a:r>
-              <a:rPr lang="en-US" smtClean="0"/>
+              <a:rPr lang="en-US"/>
               <a:t>Click to edit Master title style</a:t>
             </a:r>
             <a:endParaRPr lang="en-US" dirty="0"/>
@@ -356,35 +361,35 @@
           <a:p>
             <a:pPr lvl="0"/>
             <a:r>
-              <a:rPr lang="en-US" smtClean="0"/>
+              <a:rPr lang="en-US"/>
               <a:t>Click to edit Master text styles</a:t>
             </a:r>
           </a:p>
           <a:p>
             <a:pPr lvl="1"/>
             <a:r>
-              <a:rPr lang="en-US" smtClean="0"/>
+              <a:rPr lang="en-US"/>
               <a:t>Second level</a:t>
             </a:r>
           </a:p>
           <a:p>
             <a:pPr lvl="2"/>
             <a:r>
-              <a:rPr lang="en-US" smtClean="0"/>
+              <a:rPr lang="en-US"/>
               <a:t>Third level</a:t>
             </a:r>
           </a:p>
           <a:p>
             <a:pPr lvl="3"/>
             <a:r>
-              <a:rPr lang="en-US" smtClean="0"/>
+              <a:rPr lang="en-US"/>
               <a:t>Fourth level</a:t>
             </a:r>
           </a:p>
           <a:p>
             <a:pPr lvl="4"/>
             <a:r>
-              <a:rPr lang="en-US" smtClean="0"/>
+              <a:rPr lang="en-US"/>
               <a:t>Fifth level</a:t>
             </a:r>
             <a:endParaRPr lang="en-US" dirty="0"/>
@@ -408,7 +413,7 @@
           <a:p>
             <a:fld id="{87D48944-457E-4F70-A2DD-5C8A7CFEF89A}" type="datetimeFigureOut">
               <a:rPr lang="en-US" smtClean="0"/>
-              <a:t>9/30/2015</a:t>
+              <a:t>9/12/2017</a:t>
             </a:fld>
             <a:endParaRPr lang="en-US"/>
           </a:p>
@@ -507,7 +512,7 @@
           <a:lstStyle/>
           <a:p>
             <a:r>
-              <a:rPr lang="en-US" smtClean="0"/>
+              <a:rPr lang="en-US"/>
               <a:t>Click to edit Master title style</a:t>
             </a:r>
             <a:endParaRPr lang="en-US" dirty="0"/>
@@ -536,35 +541,35 @@
           <a:p>
             <a:pPr lvl="0"/>
             <a:r>
-              <a:rPr lang="en-US" smtClean="0"/>
+              <a:rPr lang="en-US"/>
               <a:t>Click to edit Master text styles</a:t>
             </a:r>
           </a:p>
           <a:p>
             <a:pPr lvl="1"/>
             <a:r>
-              <a:rPr lang="en-US" smtClean="0"/>
+              <a:rPr lang="en-US"/>
               <a:t>Second level</a:t>
             </a:r>
           </a:p>
           <a:p>
             <a:pPr lvl="2"/>
             <a:r>
-              <a:rPr lang="en-US" smtClean="0"/>
+              <a:rPr lang="en-US"/>
               <a:t>Third level</a:t>
             </a:r>
           </a:p>
           <a:p>
             <a:pPr lvl="3"/>
             <a:r>
-              <a:rPr lang="en-US" smtClean="0"/>
+              <a:rPr lang="en-US"/>
               <a:t>Fourth level</a:t>
             </a:r>
           </a:p>
           <a:p>
             <a:pPr lvl="4"/>
             <a:r>
-              <a:rPr lang="en-US" smtClean="0"/>
+              <a:rPr lang="en-US"/>
               <a:t>Fifth level</a:t>
             </a:r>
             <a:endParaRPr lang="en-US" dirty="0"/>
@@ -588,7 +593,7 @@
           <a:p>
             <a:fld id="{87D48944-457E-4F70-A2DD-5C8A7CFEF89A}" type="datetimeFigureOut">
               <a:rPr lang="en-US" smtClean="0"/>
-              <a:t>9/30/2015</a:t>
+              <a:t>9/12/2017</a:t>
             </a:fld>
             <a:endParaRPr lang="en-US"/>
           </a:p>
@@ -682,7 +687,7 @@
           <a:lstStyle/>
           <a:p>
             <a:r>
-              <a:rPr lang="en-US" smtClean="0"/>
+              <a:rPr lang="en-US"/>
               <a:t>Click to edit Master title style</a:t>
             </a:r>
             <a:endParaRPr lang="en-US" dirty="0"/>
@@ -706,35 +711,35 @@
           <a:p>
             <a:pPr lvl="0"/>
             <a:r>
-              <a:rPr lang="en-US" smtClean="0"/>
+              <a:rPr lang="en-US"/>
               <a:t>Click to edit Master text styles</a:t>
             </a:r>
           </a:p>
           <a:p>
             <a:pPr lvl="1"/>
             <a:r>
-              <a:rPr lang="en-US" smtClean="0"/>
+              <a:rPr lang="en-US"/>
               <a:t>Second level</a:t>
             </a:r>
           </a:p>
           <a:p>
             <a:pPr lvl="2"/>
             <a:r>
-              <a:rPr lang="en-US" smtClean="0"/>
+              <a:rPr lang="en-US"/>
               <a:t>Third level</a:t>
             </a:r>
           </a:p>
           <a:p>
             <a:pPr lvl="3"/>
             <a:r>
-              <a:rPr lang="en-US" smtClean="0"/>
+              <a:rPr lang="en-US"/>
               <a:t>Fourth level</a:t>
             </a:r>
           </a:p>
           <a:p>
             <a:pPr lvl="4"/>
             <a:r>
-              <a:rPr lang="en-US" smtClean="0"/>
+              <a:rPr lang="en-US"/>
               <a:t>Fifth level</a:t>
             </a:r>
             <a:endParaRPr lang="en-US" dirty="0"/>
@@ -758,7 +763,7 @@
           <a:p>
             <a:fld id="{87D48944-457E-4F70-A2DD-5C8A7CFEF89A}" type="datetimeFigureOut">
               <a:rPr lang="en-US" smtClean="0"/>
-              <a:t>9/30/2015</a:t>
+              <a:t>9/12/2017</a:t>
             </a:fld>
             <a:endParaRPr lang="en-US"/>
           </a:p>
@@ -861,7 +866,7 @@
           </a:lstStyle>
           <a:p>
             <a:r>
-              <a:rPr lang="en-US" smtClean="0"/>
+              <a:rPr lang="en-US"/>
               <a:t>Click to edit Master title style</a:t>
             </a:r>
             <a:endParaRPr lang="en-US" dirty="0"/>
@@ -979,7 +984,7 @@
           <a:p>
             <a:pPr lvl="0"/>
             <a:r>
-              <a:rPr lang="en-US" smtClean="0"/>
+              <a:rPr lang="en-US"/>
               <a:t>Click to edit Master text styles</a:t>
             </a:r>
           </a:p>
@@ -1002,7 +1007,7 @@
           <a:p>
             <a:fld id="{87D48944-457E-4F70-A2DD-5C8A7CFEF89A}" type="datetimeFigureOut">
               <a:rPr lang="en-US" smtClean="0"/>
-              <a:t>9/30/2015</a:t>
+              <a:t>9/12/2017</a:t>
             </a:fld>
             <a:endParaRPr lang="en-US"/>
           </a:p>
@@ -1096,7 +1101,7 @@
           <a:lstStyle/>
           <a:p>
             <a:r>
-              <a:rPr lang="en-US" smtClean="0"/>
+              <a:rPr lang="en-US"/>
               <a:t>Click to edit Master title style</a:t>
             </a:r>
             <a:endParaRPr lang="en-US" dirty="0"/>
@@ -1125,35 +1130,35 @@
           <a:p>
             <a:pPr lvl="0"/>
             <a:r>
-              <a:rPr lang="en-US" smtClean="0"/>
+              <a:rPr lang="en-US"/>
               <a:t>Click to edit Master text styles</a:t>
             </a:r>
           </a:p>
           <a:p>
             <a:pPr lvl="1"/>
             <a:r>
-              <a:rPr lang="en-US" smtClean="0"/>
+              <a:rPr lang="en-US"/>
               <a:t>Second level</a:t>
             </a:r>
           </a:p>
           <a:p>
             <a:pPr lvl="2"/>
             <a:r>
-              <a:rPr lang="en-US" smtClean="0"/>
+              <a:rPr lang="en-US"/>
               <a:t>Third level</a:t>
             </a:r>
           </a:p>
           <a:p>
             <a:pPr lvl="3"/>
             <a:r>
-              <a:rPr lang="en-US" smtClean="0"/>
+              <a:rPr lang="en-US"/>
               <a:t>Fourth level</a:t>
             </a:r>
           </a:p>
           <a:p>
             <a:pPr lvl="4"/>
             <a:r>
-              <a:rPr lang="en-US" smtClean="0"/>
+              <a:rPr lang="en-US"/>
               <a:t>Fifth level</a:t>
             </a:r>
             <a:endParaRPr lang="en-US" dirty="0"/>
@@ -1182,35 +1187,35 @@
           <a:p>
             <a:pPr lvl="0"/>
             <a:r>
-              <a:rPr lang="en-US" smtClean="0"/>
+              <a:rPr lang="en-US"/>
               <a:t>Click to edit Master text styles</a:t>
             </a:r>
           </a:p>
           <a:p>
             <a:pPr lvl="1"/>
             <a:r>
-              <a:rPr lang="en-US" smtClean="0"/>
+              <a:rPr lang="en-US"/>
               <a:t>Second level</a:t>
             </a:r>
           </a:p>
           <a:p>
             <a:pPr lvl="2"/>
             <a:r>
-              <a:rPr lang="en-US" smtClean="0"/>
+              <a:rPr lang="en-US"/>
               <a:t>Third level</a:t>
             </a:r>
           </a:p>
           <a:p>
             <a:pPr lvl="3"/>
             <a:r>
-              <a:rPr lang="en-US" smtClean="0"/>
+              <a:rPr lang="en-US"/>
               <a:t>Fourth level</a:t>
             </a:r>
           </a:p>
           <a:p>
             <a:pPr lvl="4"/>
             <a:r>
-              <a:rPr lang="en-US" smtClean="0"/>
+              <a:rPr lang="en-US"/>
               <a:t>Fifth level</a:t>
             </a:r>
             <a:endParaRPr lang="en-US" dirty="0"/>
@@ -1234,7 +1239,7 @@
           <a:p>
             <a:fld id="{87D48944-457E-4F70-A2DD-5C8A7CFEF89A}" type="datetimeFigureOut">
               <a:rPr lang="en-US" smtClean="0"/>
-              <a:t>9/30/2015</a:t>
+              <a:t>9/12/2017</a:t>
             </a:fld>
             <a:endParaRPr lang="en-US"/>
           </a:p>
@@ -1333,7 +1338,7 @@
           <a:lstStyle/>
           <a:p>
             <a:r>
-              <a:rPr lang="en-US" smtClean="0"/>
+              <a:rPr lang="en-US"/>
               <a:t>Click to edit Master title style</a:t>
             </a:r>
             <a:endParaRPr lang="en-US" dirty="0"/>
@@ -1399,7 +1404,7 @@
           <a:p>
             <a:pPr lvl="0"/>
             <a:r>
-              <a:rPr lang="en-US" smtClean="0"/>
+              <a:rPr lang="en-US"/>
               <a:t>Click to edit Master text styles</a:t>
             </a:r>
           </a:p>
@@ -1427,35 +1432,35 @@
           <a:p>
             <a:pPr lvl="0"/>
             <a:r>
-              <a:rPr lang="en-US" smtClean="0"/>
+              <a:rPr lang="en-US"/>
               <a:t>Click to edit Master text styles</a:t>
             </a:r>
           </a:p>
           <a:p>
             <a:pPr lvl="1"/>
             <a:r>
-              <a:rPr lang="en-US" smtClean="0"/>
+              <a:rPr lang="en-US"/>
               <a:t>Second level</a:t>
             </a:r>
           </a:p>
           <a:p>
             <a:pPr lvl="2"/>
             <a:r>
-              <a:rPr lang="en-US" smtClean="0"/>
+              <a:rPr lang="en-US"/>
               <a:t>Third level</a:t>
             </a:r>
           </a:p>
           <a:p>
             <a:pPr lvl="3"/>
             <a:r>
-              <a:rPr lang="en-US" smtClean="0"/>
+              <a:rPr lang="en-US"/>
               <a:t>Fourth level</a:t>
             </a:r>
           </a:p>
           <a:p>
             <a:pPr lvl="4"/>
             <a:r>
-              <a:rPr lang="en-US" smtClean="0"/>
+              <a:rPr lang="en-US"/>
               <a:t>Fifth level</a:t>
             </a:r>
             <a:endParaRPr lang="en-US" dirty="0"/>
@@ -1521,7 +1526,7 @@
           <a:p>
             <a:pPr lvl="0"/>
             <a:r>
-              <a:rPr lang="en-US" smtClean="0"/>
+              <a:rPr lang="en-US"/>
               <a:t>Click to edit Master text styles</a:t>
             </a:r>
           </a:p>
@@ -1549,35 +1554,35 @@
           <a:p>
             <a:pPr lvl="0"/>
             <a:r>
-              <a:rPr lang="en-US" smtClean="0"/>
+              <a:rPr lang="en-US"/>
               <a:t>Click to edit Master text styles</a:t>
             </a:r>
           </a:p>
           <a:p>
             <a:pPr lvl="1"/>
             <a:r>
-              <a:rPr lang="en-US" smtClean="0"/>
+              <a:rPr lang="en-US"/>
               <a:t>Second level</a:t>
             </a:r>
           </a:p>
           <a:p>
             <a:pPr lvl="2"/>
             <a:r>
-              <a:rPr lang="en-US" smtClean="0"/>
+              <a:rPr lang="en-US"/>
               <a:t>Third level</a:t>
             </a:r>
           </a:p>
           <a:p>
             <a:pPr lvl="3"/>
             <a:r>
-              <a:rPr lang="en-US" smtClean="0"/>
+              <a:rPr lang="en-US"/>
               <a:t>Fourth level</a:t>
             </a:r>
           </a:p>
           <a:p>
             <a:pPr lvl="4"/>
             <a:r>
-              <a:rPr lang="en-US" smtClean="0"/>
+              <a:rPr lang="en-US"/>
               <a:t>Fifth level</a:t>
             </a:r>
             <a:endParaRPr lang="en-US" dirty="0"/>
@@ -1601,7 +1606,7 @@
           <a:p>
             <a:fld id="{87D48944-457E-4F70-A2DD-5C8A7CFEF89A}" type="datetimeFigureOut">
               <a:rPr lang="en-US" smtClean="0"/>
-              <a:t>9/30/2015</a:t>
+              <a:t>9/12/2017</a:t>
             </a:fld>
             <a:endParaRPr lang="en-US"/>
           </a:p>
@@ -1695,7 +1700,7 @@
           <a:lstStyle/>
           <a:p>
             <a:r>
-              <a:rPr lang="en-US" smtClean="0"/>
+              <a:rPr lang="en-US"/>
               <a:t>Click to edit Master title style</a:t>
             </a:r>
             <a:endParaRPr lang="en-US" dirty="0"/>
@@ -1719,7 +1724,7 @@
           <a:p>
             <a:fld id="{87D48944-457E-4F70-A2DD-5C8A7CFEF89A}" type="datetimeFigureOut">
               <a:rPr lang="en-US" smtClean="0"/>
-              <a:t>9/30/2015</a:t>
+              <a:t>9/12/2017</a:t>
             </a:fld>
             <a:endParaRPr lang="en-US"/>
           </a:p>
@@ -1814,7 +1819,7 @@
           <a:p>
             <a:fld id="{87D48944-457E-4F70-A2DD-5C8A7CFEF89A}" type="datetimeFigureOut">
               <a:rPr lang="en-US" smtClean="0"/>
-              <a:t>9/30/2015</a:t>
+              <a:t>9/12/2017</a:t>
             </a:fld>
             <a:endParaRPr lang="en-US"/>
           </a:p>
@@ -1917,7 +1922,7 @@
           </a:lstStyle>
           <a:p>
             <a:r>
-              <a:rPr lang="en-US" smtClean="0"/>
+              <a:rPr lang="en-US"/>
               <a:t>Click to edit Master title style</a:t>
             </a:r>
             <a:endParaRPr lang="en-US" dirty="0"/>
@@ -1974,35 +1979,35 @@
           <a:p>
             <a:pPr lvl="0"/>
             <a:r>
-              <a:rPr lang="en-US" smtClean="0"/>
+              <a:rPr lang="en-US"/>
               <a:t>Click to edit Master text styles</a:t>
             </a:r>
           </a:p>
           <a:p>
             <a:pPr lvl="1"/>
             <a:r>
-              <a:rPr lang="en-US" smtClean="0"/>
+              <a:rPr lang="en-US"/>
               <a:t>Second level</a:t>
             </a:r>
           </a:p>
           <a:p>
             <a:pPr lvl="2"/>
             <a:r>
-              <a:rPr lang="en-US" smtClean="0"/>
+              <a:rPr lang="en-US"/>
               <a:t>Third level</a:t>
             </a:r>
           </a:p>
           <a:p>
             <a:pPr lvl="3"/>
             <a:r>
-              <a:rPr lang="en-US" smtClean="0"/>
+              <a:rPr lang="en-US"/>
               <a:t>Fourth level</a:t>
             </a:r>
           </a:p>
           <a:p>
             <a:pPr lvl="4"/>
             <a:r>
-              <a:rPr lang="en-US" smtClean="0"/>
+              <a:rPr lang="en-US"/>
               <a:t>Fifth level</a:t>
             </a:r>
             <a:endParaRPr lang="en-US" dirty="0"/>
@@ -2068,7 +2073,7 @@
           <a:p>
             <a:pPr lvl="0"/>
             <a:r>
-              <a:rPr lang="en-US" smtClean="0"/>
+              <a:rPr lang="en-US"/>
               <a:t>Click to edit Master text styles</a:t>
             </a:r>
           </a:p>
@@ -2091,7 +2096,7 @@
           <a:p>
             <a:fld id="{87D48944-457E-4F70-A2DD-5C8A7CFEF89A}" type="datetimeFigureOut">
               <a:rPr lang="en-US" smtClean="0"/>
-              <a:t>9/30/2015</a:t>
+              <a:t>9/12/2017</a:t>
             </a:fld>
             <a:endParaRPr lang="en-US"/>
           </a:p>
@@ -2194,7 +2199,7 @@
           </a:lstStyle>
           <a:p>
             <a:r>
-              <a:rPr lang="en-US" smtClean="0"/>
+              <a:rPr lang="en-US"/>
               <a:t>Click to edit Master title style</a:t>
             </a:r>
             <a:endParaRPr lang="en-US" dirty="0"/>
@@ -2259,7 +2264,7 @@
           </a:lstStyle>
           <a:p>
             <a:r>
-              <a:rPr lang="en-US" smtClean="0"/>
+              <a:rPr lang="en-US"/>
               <a:t>Click icon to add picture</a:t>
             </a:r>
             <a:endParaRPr lang="en-US" dirty="0"/>
@@ -2325,7 +2330,7 @@
           <a:p>
             <a:pPr lvl="0"/>
             <a:r>
-              <a:rPr lang="en-US" smtClean="0"/>
+              <a:rPr lang="en-US"/>
               <a:t>Click to edit Master text styles</a:t>
             </a:r>
           </a:p>
@@ -2348,7 +2353,7 @@
           <a:p>
             <a:fld id="{87D48944-457E-4F70-A2DD-5C8A7CFEF89A}" type="datetimeFigureOut">
               <a:rPr lang="en-US" smtClean="0"/>
-              <a:t>9/30/2015</a:t>
+              <a:t>9/12/2017</a:t>
             </a:fld>
             <a:endParaRPr lang="en-US"/>
           </a:p>
@@ -2457,7 +2462,7 @@
           <a:lstStyle/>
           <a:p>
             <a:r>
-              <a:rPr lang="en-US" smtClean="0"/>
+              <a:rPr lang="en-US"/>
               <a:t>Click to edit Master title style</a:t>
             </a:r>
             <a:endParaRPr lang="en-US" dirty="0"/>
@@ -2491,35 +2496,35 @@
           <a:p>
             <a:pPr lvl="0"/>
             <a:r>
-              <a:rPr lang="en-US" smtClean="0"/>
+              <a:rPr lang="en-US"/>
               <a:t>Click to edit Master text styles</a:t>
             </a:r>
           </a:p>
           <a:p>
             <a:pPr lvl="1"/>
             <a:r>
-              <a:rPr lang="en-US" smtClean="0"/>
+              <a:rPr lang="en-US"/>
               <a:t>Second level</a:t>
             </a:r>
           </a:p>
           <a:p>
             <a:pPr lvl="2"/>
             <a:r>
-              <a:rPr lang="en-US" smtClean="0"/>
+              <a:rPr lang="en-US"/>
               <a:t>Third level</a:t>
             </a:r>
           </a:p>
           <a:p>
             <a:pPr lvl="3"/>
             <a:r>
-              <a:rPr lang="en-US" smtClean="0"/>
+              <a:rPr lang="en-US"/>
               <a:t>Fourth level</a:t>
             </a:r>
           </a:p>
           <a:p>
             <a:pPr lvl="4"/>
             <a:r>
-              <a:rPr lang="en-US" smtClean="0"/>
+              <a:rPr lang="en-US"/>
               <a:t>Fifth level</a:t>
             </a:r>
             <a:endParaRPr lang="en-US" dirty="0"/>
@@ -2561,7 +2566,7 @@
           <a:p>
             <a:fld id="{87D48944-457E-4F70-A2DD-5C8A7CFEF89A}" type="datetimeFigureOut">
               <a:rPr lang="en-US" smtClean="0"/>
-              <a:t>9/30/2015</a:t>
+              <a:t>9/12/2017</a:t>
             </a:fld>
             <a:endParaRPr lang="en-US"/>
           </a:p>
@@ -2982,10 +2987,9 @@
           <a:lstStyle/>
           <a:p>
             <a:r>
-              <a:rPr lang="en-US" dirty="0" smtClean="0"/>
-              <a:t>Sign In Please</a:t>
-            </a:r>
-            <a:endParaRPr lang="en-US" dirty="0"/>
+              <a:rPr lang="en-US" dirty="0"/>
+              <a:t>Welcome to CS 5010</a:t>
+            </a:r>
           </a:p>
         </p:txBody>
       </p:sp>
@@ -3005,14 +3009,18 @@
           <a:lstStyle/>
           <a:p>
             <a:r>
-              <a:rPr lang="en-US" dirty="0" smtClean="0"/>
-              <a:t>At</a:t>
-            </a:r>
-          </a:p>
-          <a:p>
-            <a:r>
-              <a:rPr lang="en-US" sz="3600" dirty="0" smtClean="0"/>
-              <a:t>bit.ly/cs5010f15-wand-signin</a:t>
+              <a:rPr lang="en-US" sz="3600" dirty="0"/>
+              <a:t>Please sign in on the </a:t>
+            </a:r>
+            <a:r>
+              <a:rPr lang="en-US" sz="3600"/>
+              <a:t>roster </a:t>
+            </a:r>
+          </a:p>
+          <a:p>
+            <a:r>
+              <a:rPr lang="en-US" sz="3600"/>
+              <a:t>at the front desk</a:t>
             </a:r>
             <a:endParaRPr lang="en-US" sz="3600" dirty="0"/>
           </a:p>
@@ -3028,13 +3036,6 @@
   <p:clrMapOvr>
     <a:masterClrMapping/>
   </p:clrMapOvr>
-  <p:timing>
-    <p:tnLst>
-      <p:par>
-        <p:cTn id="1" dur="indefinite" restart="never" nodeType="tmRoot"/>
-      </p:par>
-    </p:tnLst>
-  </p:timing>
 </p:sld>
 </file>
 

</xml_diff>